<commit_message>
a few additions to lesson 3
</commit_message>
<xml_diff>
--- a/UM_DataManagementClass/Lessons/03/03_secondMeeting.pptx
+++ b/UM_DataManagementClass/Lessons/03/03_secondMeeting.pptx
@@ -5,10 +5,11 @@
     <p:sldMasterId id="2147483756" r:id="rId1"/>
   </p:sldMasterIdLst>
   <p:notesMasterIdLst>
-    <p:notesMasterId r:id="rId3"/>
+    <p:notesMasterId r:id="rId4"/>
   </p:notesMasterIdLst>
   <p:sldIdLst>
     <p:sldId id="256" r:id="rId2"/>
+    <p:sldId id="257" r:id="rId3"/>
   </p:sldIdLst>
   <p:sldSz cx="12192000" cy="6858000"/>
   <p:notesSz cx="7010400" cy="9296400"/>
@@ -109,7 +110,7 @@
   </p:defaultTextStyle>
   <p:extLst>
     <p:ext uri="{EFAFB233-063F-42B5-8137-9DF3F51BA10A}">
-      <p15:sldGuideLst xmlns:p15="http://schemas.microsoft.com/office/powerpoint/2012/main" xmlns="">
+      <p15:sldGuideLst xmlns:p15="http://schemas.microsoft.com/office/powerpoint/2012/main">
         <p15:guide id="1" orient="horz" pos="2160" userDrawn="1">
           <p15:clr>
             <a:srgbClr val="A4A3A4"/>
@@ -209,7 +210,7 @@
             <a:fld id="{0B10C68B-4B56-4C57-A100-1112E8D05063}" type="datetimeFigureOut">
               <a:rPr lang="en-US" smtClean="0"/>
               <a:pPr/>
-              <a:t>1/18/2016</a:t>
+              <a:t>1/26/2016</a:t>
             </a:fld>
             <a:endParaRPr lang="en-US"/>
           </a:p>
@@ -378,7 +379,7 @@
     </p:spTree>
     <p:extLst>
       <p:ext uri="{BB962C8B-B14F-4D97-AF65-F5344CB8AC3E}">
-        <p14:creationId xmlns="" xmlns:p14="http://schemas.microsoft.com/office/powerpoint/2010/main" val="2616926588"/>
+        <p14:creationId xmlns:p14="http://schemas.microsoft.com/office/powerpoint/2010/main" val="2616926588"/>
       </p:ext>
     </p:extLst>
   </p:cSld>
@@ -553,7 +554,7 @@
     </p:spTree>
     <p:extLst>
       <p:ext uri="{BB962C8B-B14F-4D97-AF65-F5344CB8AC3E}">
-        <p14:creationId xmlns="" xmlns:p14="http://schemas.microsoft.com/office/powerpoint/2010/main" val="111020371"/>
+        <p14:creationId xmlns:p14="http://schemas.microsoft.com/office/powerpoint/2010/main" val="111020371"/>
       </p:ext>
     </p:extLst>
   </p:cSld>
@@ -706,7 +707,7 @@
               <a:pPr>
                 <a:defRPr/>
               </a:pPr>
-              <a:t>1/18/2016</a:t>
+              <a:t>1/26/2016</a:t>
             </a:fld>
             <a:endParaRPr lang="en-US">
               <a:solidFill>
@@ -790,7 +791,7 @@
     </p:spTree>
     <p:extLst>
       <p:ext uri="{BB962C8B-B14F-4D97-AF65-F5344CB8AC3E}">
-        <p14:creationId xmlns="" xmlns:p14="http://schemas.microsoft.com/office/powerpoint/2010/main" val="588844449"/>
+        <p14:creationId xmlns:p14="http://schemas.microsoft.com/office/powerpoint/2010/main" val="588844449"/>
       </p:ext>
     </p:extLst>
   </p:cSld>
@@ -921,7 +922,7 @@
               <a:pPr>
                 <a:defRPr/>
               </a:pPr>
-              <a:t>1/18/2016</a:t>
+              <a:t>1/26/2016</a:t>
             </a:fld>
             <a:endParaRPr lang="en-US">
               <a:solidFill>
@@ -1005,7 +1006,7 @@
     </p:spTree>
     <p:extLst>
       <p:ext uri="{BB962C8B-B14F-4D97-AF65-F5344CB8AC3E}">
-        <p14:creationId xmlns="" xmlns:p14="http://schemas.microsoft.com/office/powerpoint/2010/main" val="2374176888"/>
+        <p14:creationId xmlns:p14="http://schemas.microsoft.com/office/powerpoint/2010/main" val="2374176888"/>
       </p:ext>
     </p:extLst>
   </p:cSld>
@@ -1146,7 +1147,7 @@
               <a:pPr>
                 <a:defRPr/>
               </a:pPr>
-              <a:t>1/18/2016</a:t>
+              <a:t>1/26/2016</a:t>
             </a:fld>
             <a:endParaRPr lang="en-US">
               <a:solidFill>
@@ -1230,7 +1231,7 @@
     </p:spTree>
     <p:extLst>
       <p:ext uri="{BB962C8B-B14F-4D97-AF65-F5344CB8AC3E}">
-        <p14:creationId xmlns="" xmlns:p14="http://schemas.microsoft.com/office/powerpoint/2010/main" val="991584953"/>
+        <p14:creationId xmlns:p14="http://schemas.microsoft.com/office/powerpoint/2010/main" val="991584953"/>
       </p:ext>
     </p:extLst>
   </p:cSld>
@@ -1387,7 +1388,7 @@
               <a:pPr>
                 <a:defRPr/>
               </a:pPr>
-              <a:t>1/18/2016</a:t>
+              <a:t>1/26/2016</a:t>
             </a:fld>
             <a:endParaRPr lang="en-US">
               <a:solidFill>
@@ -1471,7 +1472,7 @@
     </p:spTree>
     <p:extLst>
       <p:ext uri="{BB962C8B-B14F-4D97-AF65-F5344CB8AC3E}">
-        <p14:creationId xmlns="" xmlns:p14="http://schemas.microsoft.com/office/powerpoint/2010/main" val="379613614"/>
+        <p14:creationId xmlns:p14="http://schemas.microsoft.com/office/powerpoint/2010/main" val="379613614"/>
       </p:ext>
     </p:extLst>
   </p:cSld>
@@ -1676,7 +1677,7 @@
               <a:pPr>
                 <a:defRPr/>
               </a:pPr>
-              <a:t>1/18/2016</a:t>
+              <a:t>1/26/2016</a:t>
             </a:fld>
             <a:endParaRPr lang="en-US">
               <a:solidFill>
@@ -1760,7 +1761,7 @@
     </p:spTree>
     <p:extLst>
       <p:ext uri="{BB962C8B-B14F-4D97-AF65-F5344CB8AC3E}">
-        <p14:creationId xmlns="" xmlns:p14="http://schemas.microsoft.com/office/powerpoint/2010/main" val="1749530271"/>
+        <p14:creationId xmlns:p14="http://schemas.microsoft.com/office/powerpoint/2010/main" val="1749530271"/>
       </p:ext>
     </p:extLst>
   </p:cSld>
@@ -1997,7 +1998,7 @@
               <a:pPr>
                 <a:defRPr/>
               </a:pPr>
-              <a:t>1/18/2016</a:t>
+              <a:t>1/26/2016</a:t>
             </a:fld>
             <a:endParaRPr lang="en-US">
               <a:solidFill>
@@ -2081,7 +2082,7 @@
     </p:spTree>
     <p:extLst>
       <p:ext uri="{BB962C8B-B14F-4D97-AF65-F5344CB8AC3E}">
-        <p14:creationId xmlns="" xmlns:p14="http://schemas.microsoft.com/office/powerpoint/2010/main" val="4117643888"/>
+        <p14:creationId xmlns:p14="http://schemas.microsoft.com/office/powerpoint/2010/main" val="4117643888"/>
       </p:ext>
     </p:extLst>
   </p:cSld>
@@ -2457,7 +2458,7 @@
               <a:pPr>
                 <a:defRPr/>
               </a:pPr>
-              <a:t>1/18/2016</a:t>
+              <a:t>1/26/2016</a:t>
             </a:fld>
             <a:endParaRPr lang="en-US">
               <a:solidFill>
@@ -2541,7 +2542,7 @@
     </p:spTree>
     <p:extLst>
       <p:ext uri="{BB962C8B-B14F-4D97-AF65-F5344CB8AC3E}">
-        <p14:creationId xmlns="" xmlns:p14="http://schemas.microsoft.com/office/powerpoint/2010/main" val="3305394207"/>
+        <p14:creationId xmlns:p14="http://schemas.microsoft.com/office/powerpoint/2010/main" val="3305394207"/>
       </p:ext>
     </p:extLst>
   </p:cSld>
@@ -2628,7 +2629,7 @@
               <a:pPr>
                 <a:defRPr/>
               </a:pPr>
-              <a:t>1/18/2016</a:t>
+              <a:t>1/26/2016</a:t>
             </a:fld>
             <a:endParaRPr lang="en-US">
               <a:solidFill>
@@ -2712,7 +2713,7 @@
     </p:spTree>
     <p:extLst>
       <p:ext uri="{BB962C8B-B14F-4D97-AF65-F5344CB8AC3E}">
-        <p14:creationId xmlns="" xmlns:p14="http://schemas.microsoft.com/office/powerpoint/2010/main" val="2564282291"/>
+        <p14:creationId xmlns:p14="http://schemas.microsoft.com/office/powerpoint/2010/main" val="2564282291"/>
       </p:ext>
     </p:extLst>
   </p:cSld>
@@ -2768,7 +2769,7 @@
               <a:pPr>
                 <a:defRPr/>
               </a:pPr>
-              <a:t>1/18/2016</a:t>
+              <a:t>1/26/2016</a:t>
             </a:fld>
             <a:endParaRPr lang="en-US">
               <a:solidFill>
@@ -2852,7 +2853,7 @@
     </p:spTree>
     <p:extLst>
       <p:ext uri="{BB962C8B-B14F-4D97-AF65-F5344CB8AC3E}">
-        <p14:creationId xmlns="" xmlns:p14="http://schemas.microsoft.com/office/powerpoint/2010/main" val="2633152322"/>
+        <p14:creationId xmlns:p14="http://schemas.microsoft.com/office/powerpoint/2010/main" val="2633152322"/>
       </p:ext>
     </p:extLst>
   </p:cSld>
@@ -3090,7 +3091,7 @@
               <a:pPr>
                 <a:defRPr/>
               </a:pPr>
-              <a:t>1/18/2016</a:t>
+              <a:t>1/26/2016</a:t>
             </a:fld>
             <a:endParaRPr lang="en-US">
               <a:solidFill>
@@ -3174,7 +3175,7 @@
     </p:spTree>
     <p:extLst>
       <p:ext uri="{BB962C8B-B14F-4D97-AF65-F5344CB8AC3E}">
-        <p14:creationId xmlns="" xmlns:p14="http://schemas.microsoft.com/office/powerpoint/2010/main" val="4283600683"/>
+        <p14:creationId xmlns:p14="http://schemas.microsoft.com/office/powerpoint/2010/main" val="4283600683"/>
       </p:ext>
     </p:extLst>
   </p:cSld>
@@ -3392,7 +3393,7 @@
               <a:pPr>
                 <a:defRPr/>
               </a:pPr>
-              <a:t>1/18/2016</a:t>
+              <a:t>1/26/2016</a:t>
             </a:fld>
             <a:endParaRPr lang="en-US">
               <a:solidFill>
@@ -3476,7 +3477,7 @@
     </p:spTree>
     <p:extLst>
       <p:ext uri="{BB962C8B-B14F-4D97-AF65-F5344CB8AC3E}">
-        <p14:creationId xmlns="" xmlns:p14="http://schemas.microsoft.com/office/powerpoint/2010/main" val="3406240267"/>
+        <p14:creationId xmlns:p14="http://schemas.microsoft.com/office/powerpoint/2010/main" val="3406240267"/>
       </p:ext>
     </p:extLst>
   </p:cSld>
@@ -3650,7 +3651,7 @@
               <a:pPr>
                 <a:defRPr/>
               </a:pPr>
-              <a:t>1/18/2016</a:t>
+              <a:t>1/26/2016</a:t>
             </a:fld>
             <a:endParaRPr lang="en-US">
               <a:solidFill>
@@ -3770,7 +3771,7 @@
     </p:spTree>
     <p:extLst>
       <p:ext uri="{BB962C8B-B14F-4D97-AF65-F5344CB8AC3E}">
-        <p14:creationId xmlns="" xmlns:p14="http://schemas.microsoft.com/office/powerpoint/2010/main" val="1652920772"/>
+        <p14:creationId xmlns:p14="http://schemas.microsoft.com/office/powerpoint/2010/main" val="1652920772"/>
       </p:ext>
     </p:extLst>
   </p:cSld>
@@ -4100,7 +4101,7 @@
           <a:blip r:embed="rId3" cstate="print">
             <a:extLst>
               <a:ext uri="{28A0092B-C50C-407E-A947-70E740481C1C}">
-                <a14:useLocalDpi xmlns="" xmlns:a14="http://schemas.microsoft.com/office/drawing/2010/main" val="0"/>
+                <a14:useLocalDpi xmlns:a14="http://schemas.microsoft.com/office/drawing/2010/main" val="0"/>
               </a:ext>
             </a:extLst>
           </a:blip>
@@ -4263,7 +4264,78 @@
     </p:spTree>
     <p:extLst>
       <p:ext uri="{BB962C8B-B14F-4D97-AF65-F5344CB8AC3E}">
-        <p14:creationId xmlns="" xmlns:p14="http://schemas.microsoft.com/office/powerpoint/2010/main" val="1875680063"/>
+        <p14:creationId xmlns:p14="http://schemas.microsoft.com/office/powerpoint/2010/main" val="1875680063"/>
+      </p:ext>
+    </p:extLst>
+  </p:cSld>
+  <p:clrMapOvr>
+    <a:masterClrMapping/>
+  </p:clrMapOvr>
+</p:sld>
+</file>
+
+<file path=ppt/slides/slide2.xml><?xml version="1.0" encoding="utf-8"?>
+<p:sld xmlns:a="http://schemas.openxmlformats.org/drawingml/2006/main" xmlns:r="http://schemas.openxmlformats.org/officeDocument/2006/relationships" xmlns:p="http://schemas.openxmlformats.org/presentationml/2006/main">
+  <p:cSld>
+    <p:spTree>
+      <p:nvGrpSpPr>
+        <p:cNvPr id="1" name=""/>
+        <p:cNvGrpSpPr/>
+        <p:nvPr/>
+      </p:nvGrpSpPr>
+      <p:grpSpPr>
+        <a:xfrm>
+          <a:off x="0" y="0"/>
+          <a:ext cx="0" cy="0"/>
+          <a:chOff x="0" y="0"/>
+          <a:chExt cx="0" cy="0"/>
+        </a:xfrm>
+      </p:grpSpPr>
+      <p:sp>
+        <p:nvSpPr>
+          <p:cNvPr id="2" name="Title 1"/>
+          <p:cNvSpPr>
+            <a:spLocks noGrp="1"/>
+          </p:cNvSpPr>
+          <p:nvPr>
+            <p:ph type="title"/>
+          </p:nvPr>
+        </p:nvSpPr>
+        <p:spPr/>
+        <p:txBody>
+          <a:bodyPr/>
+          <a:lstStyle/>
+          <a:p>
+            <a:endParaRPr lang="en-US"/>
+          </a:p>
+        </p:txBody>
+      </p:sp>
+      <p:sp>
+        <p:nvSpPr>
+          <p:cNvPr id="3" name="Content Placeholder 2"/>
+          <p:cNvSpPr>
+            <a:spLocks noGrp="1"/>
+          </p:cNvSpPr>
+          <p:nvPr>
+            <p:ph idx="1"/>
+          </p:nvPr>
+        </p:nvSpPr>
+        <p:spPr/>
+        <p:txBody>
+          <a:bodyPr/>
+          <a:lstStyle/>
+          <a:p>
+            <a:r>
+              <a:rPr lang="en-US" dirty="0"/>
+              <a:t>http://dublincore.org/documents/usageguide/elements.shtml</a:t>
+            </a:r>
+          </a:p>
+        </p:txBody>
+      </p:sp>
+    </p:spTree>
+    <p:extLst>
+      <p:ext uri="{BB962C8B-B14F-4D97-AF65-F5344CB8AC3E}">
+        <p14:creationId xmlns:p14="http://schemas.microsoft.com/office/powerpoint/2010/main" val="4125781064"/>
       </p:ext>
     </p:extLst>
   </p:cSld>
@@ -4528,7 +4600,7 @@
   <a:extraClrSchemeLst/>
   <a:extLst>
     <a:ext uri="{05A4C25C-085E-4340-85A3-A5531E510DB2}">
-      <thm15:themeFamily xmlns:thm15="http://schemas.microsoft.com/office/thememl/2012/main" xmlns="" name="Office Theme" id="{62F939B6-93AF-4DB8-9C6B-D6C7DFDC589F}" vid="{4A3C46E8-61CC-4603-A589-7422A47A8E4A}"/>
+      <thm15:themeFamily xmlns:thm15="http://schemas.microsoft.com/office/thememl/2012/main" name="Office Theme" id="{62F939B6-93AF-4DB8-9C6B-D6C7DFDC589F}" vid="{4A3C46E8-61CC-4603-A589-7422A47A8E4A}"/>
     </a:ext>
   </a:extLst>
 </a:theme>
@@ -4789,7 +4861,7 @@
   <a:extraClrSchemeLst/>
   <a:extLst>
     <a:ext uri="{05A4C25C-085E-4340-85A3-A5531E510DB2}">
-      <thm15:themeFamily xmlns:thm15="http://schemas.microsoft.com/office/thememl/2012/main" xmlns="" name="Office Theme" id="{62F939B6-93AF-4DB8-9C6B-D6C7DFDC589F}" vid="{4A3C46E8-61CC-4603-A589-7422A47A8E4A}"/>
+      <thm15:themeFamily xmlns:thm15="http://schemas.microsoft.com/office/thememl/2012/main" name="Office Theme" id="{62F939B6-93AF-4DB8-9C6B-D6C7DFDC589F}" vid="{4A3C46E8-61CC-4603-A589-7422A47A8E4A}"/>
     </a:ext>
   </a:extLst>
 </a:theme>

</xml_diff>